<commit_message>
Update and spell check etc
</commit_message>
<xml_diff>
--- a/tutorial-08-app_design.pptx
+++ b/tutorial-08-app_design.pptx
@@ -213,7 +213,7 @@
           <a:p>
             <a:fld id="{775CE290-E0F5-444C-B849-A8F17CD4104C}" type="datetimeFigureOut">
               <a:rPr lang="en-US" smtClean="0"/>
-              <a:t>9/8/14</a:t>
+              <a:t>9/9/14</a:t>
             </a:fld>
             <a:endParaRPr lang="en-US"/>
           </a:p>
@@ -379,7 +379,7 @@
           <a:p>
             <a:fld id="{AD53A24C-4135-094C-957B-35852E7EDFA4}" type="datetimeFigureOut">
               <a:rPr lang="en-US" smtClean="0"/>
-              <a:t>9/8/14</a:t>
+              <a:t>9/9/14</a:t>
             </a:fld>
             <a:endParaRPr lang="en-US"/>
           </a:p>
@@ -840,7 +840,7 @@
           <a:p>
             <a:fld id="{B594EA25-E4F4-3746-A0BA-A11E27330E0F}" type="datetime2">
               <a:rPr lang="en-US" smtClean="0"/>
-              <a:t>Monday, September 8, 14</a:t>
+              <a:t>Tuesday, September 9, 14</a:t>
             </a:fld>
             <a:endParaRPr lang="en-US"/>
           </a:p>
@@ -1143,7 +1143,7 @@
                 <a:latin typeface="Times New Roman"/>
                 <a:cs typeface="Times New Roman"/>
               </a:rPr>
-              <a:t>September 8, 2014</a:t>
+              <a:t>September 9, 2014</a:t>
             </a:fld>
             <a:endParaRPr lang="en-US" dirty="0">
               <a:latin typeface="Times New Roman"/>
@@ -1430,7 +1430,7 @@
           <a:p>
             <a:fld id="{EA699BF9-66CB-F244-8E74-7B1BE1C77046}" type="datetime2">
               <a:rPr lang="en-US" smtClean="0"/>
-              <a:t>Monday, September 8, 14</a:t>
+              <a:t>Tuesday, September 9, 14</a:t>
             </a:fld>
             <a:endParaRPr lang="en-US"/>
           </a:p>
@@ -1741,7 +1741,7 @@
           <a:p>
             <a:fld id="{D300BE84-9843-8B4F-B3C8-647B06AC46C9}" type="datetime2">
               <a:rPr lang="en-US" smtClean="0"/>
-              <a:t>Monday, September 8, 14</a:t>
+              <a:t>Tuesday, September 9, 14</a:t>
             </a:fld>
             <a:endParaRPr lang="en-US"/>
           </a:p>
@@ -1912,7 +1912,7 @@
           <a:p>
             <a:fld id="{C460AE39-2092-A945-8296-F25085B9A0F1}" type="datetime2">
               <a:rPr lang="en-US" smtClean="0"/>
-              <a:t>Monday, September 8, 14</a:t>
+              <a:t>Tuesday, September 9, 14</a:t>
             </a:fld>
             <a:endParaRPr lang="en-US"/>
           </a:p>
@@ -2093,7 +2093,7 @@
           <a:p>
             <a:fld id="{63BC7E9D-3218-5E49-A867-E087AB2F4618}" type="datetime2">
               <a:rPr lang="en-US" smtClean="0"/>
-              <a:t>Monday, September 8, 14</a:t>
+              <a:t>Tuesday, September 9, 14</a:t>
             </a:fld>
             <a:endParaRPr lang="en-US"/>
           </a:p>
@@ -2264,7 +2264,7 @@
           <a:p>
             <a:fld id="{34621E95-60A9-FF44-9869-513D9D7A859F}" type="datetime2">
               <a:rPr lang="en-US" smtClean="0"/>
-              <a:t>Monday, September 8, 14</a:t>
+              <a:t>Tuesday, September 9, 14</a:t>
             </a:fld>
             <a:endParaRPr lang="en-US"/>
           </a:p>
@@ -2383,7 +2383,7 @@
           <a:p>
             <a:fld id="{BD5AFB16-13FE-DF4A-8CB7-09756A57B2EA}" type="datetime2">
               <a:rPr lang="en-US" smtClean="0"/>
-              <a:t>Monday, September 8, 14</a:t>
+              <a:t>Tuesday, September 9, 14</a:t>
             </a:fld>
             <a:endParaRPr lang="en-US" dirty="0"/>
           </a:p>
@@ -2870,7 +2870,7 @@
           <a:p>
             <a:fld id="{1BDEC705-8EA9-6C46-8E3B-2CAC7E2C0F7D}" type="datetime2">
               <a:rPr lang="en-US" smtClean="0"/>
-              <a:t>Monday, September 8, 14</a:t>
+              <a:t>Tuesday, September 9, 14</a:t>
             </a:fld>
             <a:endParaRPr lang="en-US"/>
           </a:p>
@@ -3201,7 +3201,7 @@
           <a:p>
             <a:fld id="{BF613BD3-C5FD-9543-B738-679BF38D8C83}" type="datetime2">
               <a:rPr lang="en-US" smtClean="0"/>
-              <a:t>Monday, September 8, 14</a:t>
+              <a:t>Tuesday, September 9, 14</a:t>
             </a:fld>
             <a:endParaRPr lang="en-US" dirty="0"/>
           </a:p>
@@ -3680,7 +3680,7 @@
           <a:p>
             <a:fld id="{4B5E4F0C-9A9C-5448-99FD-D30288B385C9}" type="datetime2">
               <a:rPr lang="en-US" smtClean="0"/>
-              <a:t>Monday, September 8, 14</a:t>
+              <a:t>Tuesday, September 9, 14</a:t>
             </a:fld>
             <a:endParaRPr lang="en-US"/>
           </a:p>
@@ -3976,7 +3976,7 @@
           <a:p>
             <a:fld id="{30545249-FD76-6844-B252-CAB05FC2DAA8}" type="datetime2">
               <a:rPr lang="en-US" smtClean="0"/>
-              <a:t>Monday, September 8, 14</a:t>
+              <a:t>Tuesday, September 9, 14</a:t>
             </a:fld>
             <a:endParaRPr lang="en-US" dirty="0"/>
           </a:p>
@@ -4220,7 +4220,7 @@
           <a:p>
             <a:fld id="{CC859171-EEDD-0B48-A5C0-E7218AE20EA7}" type="datetime2">
               <a:rPr lang="en-US" smtClean="0"/>
-              <a:t>Monday, September 8, 14</a:t>
+              <a:t>Tuesday, September 9, 14</a:t>
             </a:fld>
             <a:endParaRPr lang="en-US"/>
           </a:p>
@@ -4316,7 +4316,7 @@
           <a:p>
             <a:fld id="{C32F9216-0342-7440-9504-BD6C1382BF27}" type="datetime2">
               <a:rPr lang="en-US" smtClean="0"/>
-              <a:t>Monday, September 8, 14</a:t>
+              <a:t>Tuesday, September 9, 14</a:t>
             </a:fld>
             <a:endParaRPr lang="en-US"/>
           </a:p>
@@ -4587,7 +4587,7 @@
           <a:p>
             <a:fld id="{D36DC8F2-AD63-E841-8C23-5DC3A41041BE}" type="datetime2">
               <a:rPr lang="en-US" smtClean="0"/>
-              <a:t>Monday, September 8, 14</a:t>
+              <a:t>Tuesday, September 9, 14</a:t>
             </a:fld>
             <a:endParaRPr lang="en-US" dirty="0"/>
           </a:p>
@@ -5306,7 +5306,7 @@
           <a:p>
             <a:fld id="{7DCE861A-EA6B-EA43-8AA5-DB216DBB40BC}" type="datetime2">
               <a:rPr lang="en-US" smtClean="0"/>
-              <a:t>Monday, September 8, 14</a:t>
+              <a:t>Tuesday, September 9, 14</a:t>
             </a:fld>
             <a:endParaRPr lang="en-US"/>
           </a:p>
@@ -5582,7 +5582,15 @@
             </a:r>
             <a:r>
               <a:rPr lang="en-US" dirty="0"/>
-              <a:t>has better aspect ratios, so you “open up fewer nodes </a:t>
+              <a:t>has better aspect ratios, so you </a:t>
+            </a:r>
+            <a:r>
+              <a:rPr lang="en-US" dirty="0" smtClean="0"/>
+              <a:t>open </a:t>
+            </a:r>
+            <a:r>
+              <a:rPr lang="en-US" dirty="0"/>
+              <a:t>up fewer nodes </a:t>
             </a:r>
             <a:endParaRPr lang="en-US" dirty="0" smtClean="0"/>
           </a:p>
@@ -5613,8 +5621,8 @@
               <a:t>: one-to-one map between sub-trees and </a:t>
             </a:r>
             <a:r>
-              <a:rPr lang="en-US" dirty="0" err="1" smtClean="0"/>
-              <a:t>Pes</a:t>
+              <a:rPr lang="en-US" dirty="0" smtClean="0"/>
+              <a:t>PEs</a:t>
             </a:r>
             <a:endParaRPr lang="en-US" dirty="0"/>
           </a:p>
@@ -5665,7 +5673,7 @@
           <a:p>
             <a:fld id="{34621E95-60A9-FF44-9869-513D9D7A859F}" type="datetime2">
               <a:rPr lang="en-US" smtClean="0"/>
-              <a:t>Monday, September 8, 14</a:t>
+              <a:t>Tuesday, September 9, 14</a:t>
             </a:fld>
             <a:endParaRPr lang="en-US"/>
           </a:p>
@@ -6187,7 +6195,7 @@
           <a:p>
             <a:fld id="{34621E95-60A9-FF44-9869-513D9D7A859F}" type="datetime2">
               <a:rPr lang="en-US" smtClean="0"/>
-              <a:t>Monday, September 8, 14</a:t>
+              <a:t>Tuesday, September 9, 14</a:t>
             </a:fld>
             <a:endParaRPr lang="en-US"/>
           </a:p>
@@ -6251,6 +6259,13 @@
   <p:clrMapOvr>
     <a:masterClrMapping/>
   </p:clrMapOvr>
+  <p:timing>
+    <p:tnLst>
+      <p:par>
+        <p:cTn xmlns:p14="http://schemas.microsoft.com/office/powerpoint/2010/main" id="1" dur="indefinite" restart="never" nodeType="tmRoot"/>
+      </p:par>
+    </p:tnLst>
+  </p:timing>
 </p:sld>
 </file>
 
@@ -6297,8 +6312,8 @@
               <a:t>: MD with quantum </a:t>
             </a:r>
             <a:r>
-              <a:rPr lang="en-US" dirty="0" err="1"/>
-              <a:t>e↵ects</a:t>
+              <a:rPr lang="en-US" dirty="0" smtClean="0"/>
+              <a:t>effects</a:t>
             </a:r>
             <a:endParaRPr lang="en-US" dirty="0"/>
           </a:p>
@@ -6429,7 +6444,7 @@
           <a:p>
             <a:fld id="{BF613BD3-C5FD-9543-B738-679BF38D8C83}" type="datetime2">
               <a:rPr lang="en-US" smtClean="0"/>
-              <a:t>Monday, September 8, 14</a:t>
+              <a:t>Tuesday, September 9, 14</a:t>
             </a:fld>
             <a:endParaRPr lang="en-US" dirty="0"/>
           </a:p>
@@ -6996,7 +7011,7 @@
           <a:p>
             <a:fld id="{BF613BD3-C5FD-9543-B738-679BF38D8C83}" type="datetime2">
               <a:rPr lang="en-US" smtClean="0"/>
-              <a:t>Monday, September 8, 14</a:t>
+              <a:t>Tuesday, September 9, 14</a:t>
             </a:fld>
             <a:endParaRPr lang="en-US" dirty="0"/>
           </a:p>
@@ -7158,7 +7173,7 @@
           <a:p>
             <a:fld id="{34621E95-60A9-FF44-9869-513D9D7A859F}" type="datetime2">
               <a:rPr lang="en-US" smtClean="0"/>
-              <a:t>Monday, September 8, 14</a:t>
+              <a:t>Tuesday, September 9, 14</a:t>
             </a:fld>
             <a:endParaRPr lang="en-US"/>
           </a:p>
@@ -7252,6 +7267,13 @@
   <p:clrMapOvr>
     <a:masterClrMapping/>
   </p:clrMapOvr>
+  <p:timing>
+    <p:tnLst>
+      <p:par>
+        <p:cTn xmlns:p14="http://schemas.microsoft.com/office/powerpoint/2010/main" id="1" dur="indefinite" restart="never" nodeType="tmRoot"/>
+      </p:par>
+    </p:tnLst>
+  </p:timing>
 </p:sld>
 </file>
 
@@ -7341,8 +7363,20 @@
               <a:t>Relatively </a:t>
             </a:r>
             <a:r>
+              <a:rPr lang="en-US" dirty="0" smtClean="0"/>
+              <a:t>small amount </a:t>
+            </a:r>
+            <a:r>
               <a:rPr lang="en-US" dirty="0"/>
-              <a:t>small of atoms (100K 10M)</a:t>
+              <a:t>of atoms (100K </a:t>
+            </a:r>
+            <a:r>
+              <a:rPr lang="en-US" dirty="0" smtClean="0"/>
+              <a:t>– 10M</a:t>
+            </a:r>
+            <a:r>
+              <a:rPr lang="en-US" dirty="0"/>
+              <a:t>)</a:t>
             </a:r>
           </a:p>
           <a:p>
@@ -7424,12 +7458,6 @@
               <a:rPr lang="en-US" dirty="0"/>
               <a:t>Challenge: femtosecond time-step, millions needed!</a:t>
             </a:r>
-          </a:p>
-          <a:p>
-            <a:pPr marL="0" indent="0">
-              <a:buNone/>
-            </a:pPr>
-            <a:endParaRPr lang="en-US" dirty="0" smtClean="0"/>
           </a:p>
           <a:p>
             <a:pPr marL="0" indent="0">
@@ -7503,7 +7531,7 @@
           <a:p>
             <a:fld id="{34621E95-60A9-FF44-9869-513D9D7A859F}" type="datetime2">
               <a:rPr lang="en-US" smtClean="0"/>
-              <a:t>Monday, September 8, 14</a:t>
+              <a:t>Tuesday, September 9, 14</a:t>
             </a:fld>
             <a:endParaRPr lang="en-US"/>
           </a:p>
@@ -7917,7 +7945,7 @@
                                         <p:tgtEl>
                                           <p:spTgt spid="3">
                                             <p:txEl>
-                                              <p:pRg st="12" end="12"/>
+                                              <p:pRg st="11" end="11"/>
                                             </p:txEl>
                                           </p:spTgt>
                                         </p:tgtEl>
@@ -8069,7 +8097,7 @@
         <p:spPr/>
         <p:txBody>
           <a:bodyPr anchor="ctr">
-            <a:normAutofit fontScale="85000" lnSpcReduction="20000"/>
+            <a:normAutofit fontScale="92500" lnSpcReduction="20000"/>
           </a:bodyPr>
           <a:lstStyle/>
           <a:p>
@@ -8085,8 +8113,13 @@
           <a:p>
             <a:r>
               <a:rPr lang="en-US" dirty="0"/>
-              <a:t>Size of each cube :</a:t>
-            </a:r>
+              <a:t>Size of each </a:t>
+            </a:r>
+            <a:r>
+              <a:rPr lang="en-US" dirty="0" smtClean="0"/>
+              <a:t>cube:</a:t>
+            </a:r>
+            <a:endParaRPr lang="en-US" dirty="0"/>
           </a:p>
           <a:p>
             <a:pPr lvl="1"/>
@@ -8096,7 +8129,19 @@
             </a:r>
             <a:r>
               <a:rPr lang="en-US" dirty="0"/>
-              <a:t>a bit larger than cut-o↵ radius </a:t>
+              <a:t>a bit larger than cut-</a:t>
+            </a:r>
+            <a:r>
+              <a:rPr lang="en-US" dirty="0" smtClean="0"/>
+              <a:t>o</a:t>
+            </a:r>
+            <a:r>
+              <a:rPr lang="en-US" dirty="0" smtClean="0"/>
+              <a:t>ff </a:t>
+            </a:r>
+            <a:r>
+              <a:rPr lang="en-US" dirty="0" smtClean="0"/>
+              <a:t>radius </a:t>
             </a:r>
             <a:endParaRPr lang="en-US" dirty="0" smtClean="0"/>
           </a:p>
@@ -8169,12 +8214,6 @@
               <a:rPr lang="en-US" dirty="0"/>
               <a:t>parallelism</a:t>
             </a:r>
-          </a:p>
-          <a:p>
-            <a:pPr marL="0" indent="0">
-              <a:buNone/>
-            </a:pPr>
-            <a:endParaRPr lang="en-US" dirty="0" smtClean="0"/>
           </a:p>
           <a:p>
             <a:pPr marL="0" indent="0">
@@ -8216,7 +8255,7 @@
           <a:p>
             <a:fld id="{BF613BD3-C5FD-9543-B738-679BF38D8C83}" type="datetime2">
               <a:rPr lang="en-US" smtClean="0"/>
-              <a:t>Monday, September 8, 14</a:t>
+              <a:t>Tuesday, September 9, 14</a:t>
             </a:fld>
             <a:endParaRPr lang="en-US" dirty="0"/>
           </a:p>
@@ -8600,7 +8639,7 @@
                                         <p:tgtEl>
                                           <p:spTgt spid="4">
                                             <p:txEl>
-                                              <p:pRg st="10" end="10"/>
+                                              <p:pRg st="9" end="9"/>
                                             </p:txEl>
                                           </p:spTgt>
                                         </p:tgtEl>
@@ -8840,7 +8879,7 @@
           <a:p>
             <a:fld id="{BF613BD3-C5FD-9543-B738-679BF38D8C83}" type="datetime2">
               <a:rPr lang="en-US" smtClean="0"/>
-              <a:t>Monday, September 8, 14</a:t>
+              <a:t>Tuesday, September 9, 14</a:t>
             </a:fld>
             <a:endParaRPr lang="en-US" dirty="0"/>
           </a:p>
@@ -9216,7 +9255,7 @@
           <a:p>
             <a:fld id="{34621E95-60A9-FF44-9869-513D9D7A859F}" type="datetime2">
               <a:rPr lang="en-US" smtClean="0"/>
-              <a:t>Monday, September 8, 14</a:t>
+              <a:t>Tuesday, September 9, 14</a:t>
             </a:fld>
             <a:endParaRPr lang="en-US"/>
           </a:p>
@@ -9400,7 +9439,7 @@
           <a:p>
             <a:fld id="{34621E95-60A9-FF44-9869-513D9D7A859F}" type="datetime2">
               <a:rPr lang="en-US" smtClean="0"/>
-              <a:t>Monday, September 8, 14</a:t>
+              <a:t>Tuesday, September 9, 14</a:t>
             </a:fld>
             <a:endParaRPr lang="en-US"/>
           </a:p>
@@ -9547,7 +9586,7 @@
           <a:p>
             <a:fld id="{34621E95-60A9-FF44-9869-513D9D7A859F}" type="datetime2">
               <a:rPr lang="en-US" smtClean="0"/>
-              <a:t>Monday, September 8, 14</a:t>
+              <a:t>Tuesday, September 9, 14</a:t>
             </a:fld>
             <a:endParaRPr lang="en-US"/>
           </a:p>
@@ -9724,7 +9763,7 @@
           <a:p>
             <a:fld id="{34621E95-60A9-FF44-9869-513D9D7A859F}" type="datetime2">
               <a:rPr lang="en-US" smtClean="0"/>
-              <a:t>Monday, September 8, 14</a:t>
+              <a:t>Tuesday, September 9, 14</a:t>
             </a:fld>
             <a:endParaRPr lang="en-US"/>
           </a:p>

</xml_diff>